<commit_message>
Replaced templates (user ones with no metadata)
</commit_message>
<xml_diff>
--- a/services/src/main/resources/files/template.pptx
+++ b/services/src/main/resources/files/template.pptx
@@ -11,7 +11,7 @@
   <p:notesSz cx="6858000" cy="9144000"/>
   <p:defaultTextStyle>
     <a:defPPr>
-      <a:defRPr lang="en-US"/>
+      <a:defRPr lang="ru-RU"/>
     </a:defPPr>
     <a:lvl1pPr marL="0" algn="l" defTabSz="914400" rtl="0" eaLnBrk="1" latinLnBrk="0" hangingPunct="1">
       <a:defRPr sz="1800" kern="1200">
@@ -109,7 +109,7 @@
 
 <file path=ppt/slideLayouts/slideLayout1.xml><?xml version="1.0" encoding="utf-8"?>
 <p:sldLayout xmlns:a="http://schemas.openxmlformats.org/drawingml/2006/main" xmlns:r="http://schemas.openxmlformats.org/officeDocument/2006/relationships" xmlns:p="http://schemas.openxmlformats.org/presentationml/2006/main" type="title" preserve="1">
-  <p:cSld name="Title Slide">
+  <p:cSld name="Титульный слайд">
     <p:spTree>
       <p:nvGrpSpPr>
         <p:cNvPr id="1" name=""/>
@@ -126,7 +126,7 @@
       </p:grpSpPr>
       <p:sp>
         <p:nvSpPr>
-          <p:cNvPr id="2" name="Title 1"/>
+          <p:cNvPr id="2" name="Заголовок 1"/>
           <p:cNvSpPr>
             <a:spLocks noGrp="1"/>
           </p:cNvSpPr>
@@ -145,16 +145,16 @@
           <a:lstStyle/>
           <a:p>
             <a:r>
-              <a:rPr lang="en-US" smtClean="0"/>
-              <a:t>Click to edit Master title style</a:t>
-            </a:r>
-            <a:endParaRPr lang="en-US"/>
-          </a:p>
-        </p:txBody>
-      </p:sp>
-      <p:sp>
-        <p:nvSpPr>
-          <p:cNvPr id="3" name="Subtitle 2"/>
+              <a:rPr lang="ru-RU" smtClean="0"/>
+              <a:t>Образец заголовка</a:t>
+            </a:r>
+            <a:endParaRPr lang="ru-RU"/>
+          </a:p>
+        </p:txBody>
+      </p:sp>
+      <p:sp>
+        <p:nvSpPr>
+          <p:cNvPr id="3" name="Подзаголовок 2"/>
           <p:cNvSpPr>
             <a:spLocks noGrp="1"/>
           </p:cNvSpPr>
@@ -264,16 +264,16 @@
           </a:lstStyle>
           <a:p>
             <a:r>
-              <a:rPr lang="en-US" smtClean="0"/>
-              <a:t>Click to edit Master subtitle style</a:t>
-            </a:r>
-            <a:endParaRPr lang="en-US"/>
-          </a:p>
-        </p:txBody>
-      </p:sp>
-      <p:sp>
-        <p:nvSpPr>
-          <p:cNvPr id="4" name="Date Placeholder 3"/>
+              <a:rPr lang="ru-RU" smtClean="0"/>
+              <a:t>Образец подзаголовка</a:t>
+            </a:r>
+            <a:endParaRPr lang="ru-RU"/>
+          </a:p>
+        </p:txBody>
+      </p:sp>
+      <p:sp>
+        <p:nvSpPr>
+          <p:cNvPr id="4" name="Дата 3"/>
           <p:cNvSpPr>
             <a:spLocks noGrp="1"/>
           </p:cNvSpPr>
@@ -286,17 +286,17 @@
           <a:bodyPr/>
           <a:lstStyle/>
           <a:p>
-            <a:fld id="{6BEA9FEF-F98A-47E0-9C21-541796582112}" type="datetimeFigureOut">
-              <a:rPr lang="en-US" smtClean="0"/>
-              <a:t>4/10/2019</a:t>
+            <a:fld id="{C5EFBD4B-3E12-4C3F-80E2-AB0596552E20}" type="datetimeFigureOut">
+              <a:rPr lang="ru-RU" smtClean="0"/>
+              <a:t>30.01.2020</a:t>
             </a:fld>
-            <a:endParaRPr lang="en-US"/>
-          </a:p>
-        </p:txBody>
-      </p:sp>
-      <p:sp>
-        <p:nvSpPr>
-          <p:cNvPr id="5" name="Footer Placeholder 4"/>
+            <a:endParaRPr lang="ru-RU"/>
+          </a:p>
+        </p:txBody>
+      </p:sp>
+      <p:sp>
+        <p:nvSpPr>
+          <p:cNvPr id="5" name="Нижний колонтитул 4"/>
           <p:cNvSpPr>
             <a:spLocks noGrp="1"/>
           </p:cNvSpPr>
@@ -309,13 +309,13 @@
           <a:bodyPr/>
           <a:lstStyle/>
           <a:p>
-            <a:endParaRPr lang="en-US"/>
-          </a:p>
-        </p:txBody>
-      </p:sp>
-      <p:sp>
-        <p:nvSpPr>
-          <p:cNvPr id="6" name="Slide Number Placeholder 5"/>
+            <a:endParaRPr lang="ru-RU"/>
+          </a:p>
+        </p:txBody>
+      </p:sp>
+      <p:sp>
+        <p:nvSpPr>
+          <p:cNvPr id="6" name="Номер слайда 5"/>
           <p:cNvSpPr>
             <a:spLocks noGrp="1"/>
           </p:cNvSpPr>
@@ -328,18 +328,18 @@
           <a:bodyPr/>
           <a:lstStyle/>
           <a:p>
-            <a:fld id="{69FECE0F-3224-4FD0-AD1A-6EBF0A13B0A2}" type="slidenum">
-              <a:rPr lang="en-US" smtClean="0"/>
+            <a:fld id="{36255947-ADA5-4F8E-8AAD-4E02849B2E3E}" type="slidenum">
+              <a:rPr lang="ru-RU" smtClean="0"/>
               <a:t>‹#›</a:t>
             </a:fld>
-            <a:endParaRPr lang="en-US"/>
+            <a:endParaRPr lang="ru-RU"/>
           </a:p>
         </p:txBody>
       </p:sp>
     </p:spTree>
     <p:extLst>
       <p:ext uri="{BB962C8B-B14F-4D97-AF65-F5344CB8AC3E}">
-        <p14:creationId xmlns:p14="http://schemas.microsoft.com/office/powerpoint/2010/main" val="3175528017"/>
+        <p14:creationId xmlns:p14="http://schemas.microsoft.com/office/powerpoint/2010/main" val="2163289394"/>
       </p:ext>
     </p:extLst>
   </p:cSld>
@@ -351,7 +351,7 @@
 
 <file path=ppt/slideLayouts/slideLayout10.xml><?xml version="1.0" encoding="utf-8"?>
 <p:sldLayout xmlns:a="http://schemas.openxmlformats.org/drawingml/2006/main" xmlns:r="http://schemas.openxmlformats.org/officeDocument/2006/relationships" xmlns:p="http://schemas.openxmlformats.org/presentationml/2006/main" type="vertTx" preserve="1">
-  <p:cSld name="Title and Vertical Text">
+  <p:cSld name="Заголовок и вертикальный текст">
     <p:spTree>
       <p:nvGrpSpPr>
         <p:cNvPr id="1" name=""/>
@@ -368,7 +368,7 @@
       </p:grpSpPr>
       <p:sp>
         <p:nvSpPr>
-          <p:cNvPr id="2" name="Title 1"/>
+          <p:cNvPr id="2" name="Заголовок 1"/>
           <p:cNvSpPr>
             <a:spLocks noGrp="1"/>
           </p:cNvSpPr>
@@ -382,16 +382,16 @@
           <a:lstStyle/>
           <a:p>
             <a:r>
-              <a:rPr lang="en-US" smtClean="0"/>
-              <a:t>Click to edit Master title style</a:t>
-            </a:r>
-            <a:endParaRPr lang="en-US"/>
-          </a:p>
-        </p:txBody>
-      </p:sp>
-      <p:sp>
-        <p:nvSpPr>
-          <p:cNvPr id="3" name="Vertical Text Placeholder 2"/>
+              <a:rPr lang="ru-RU" smtClean="0"/>
+              <a:t>Образец заголовка</a:t>
+            </a:r>
+            <a:endParaRPr lang="ru-RU"/>
+          </a:p>
+        </p:txBody>
+      </p:sp>
+      <p:sp>
+        <p:nvSpPr>
+          <p:cNvPr id="3" name="Вертикальный текст 2"/>
           <p:cNvSpPr>
             <a:spLocks noGrp="1"/>
           </p:cNvSpPr>
@@ -406,44 +406,44 @@
           <a:p>
             <a:pPr lvl="0"/>
             <a:r>
-              <a:rPr lang="en-US" smtClean="0"/>
-              <a:t>Click to edit Master text styles</a:t>
+              <a:rPr lang="ru-RU" smtClean="0"/>
+              <a:t>Образец текста</a:t>
             </a:r>
           </a:p>
           <a:p>
             <a:pPr lvl="1"/>
             <a:r>
-              <a:rPr lang="en-US" smtClean="0"/>
-              <a:t>Second level</a:t>
+              <a:rPr lang="ru-RU" smtClean="0"/>
+              <a:t>Второй уровень</a:t>
             </a:r>
           </a:p>
           <a:p>
             <a:pPr lvl="2"/>
             <a:r>
-              <a:rPr lang="en-US" smtClean="0"/>
-              <a:t>Third level</a:t>
+              <a:rPr lang="ru-RU" smtClean="0"/>
+              <a:t>Третий уровень</a:t>
             </a:r>
           </a:p>
           <a:p>
             <a:pPr lvl="3"/>
             <a:r>
-              <a:rPr lang="en-US" smtClean="0"/>
-              <a:t>Fourth level</a:t>
+              <a:rPr lang="ru-RU" smtClean="0"/>
+              <a:t>Четвертый уровень</a:t>
             </a:r>
           </a:p>
           <a:p>
             <a:pPr lvl="4"/>
             <a:r>
-              <a:rPr lang="en-US" smtClean="0"/>
-              <a:t>Fifth level</a:t>
-            </a:r>
-            <a:endParaRPr lang="en-US"/>
-          </a:p>
-        </p:txBody>
-      </p:sp>
-      <p:sp>
-        <p:nvSpPr>
-          <p:cNvPr id="4" name="Date Placeholder 3"/>
+              <a:rPr lang="ru-RU" smtClean="0"/>
+              <a:t>Пятый уровень</a:t>
+            </a:r>
+            <a:endParaRPr lang="ru-RU"/>
+          </a:p>
+        </p:txBody>
+      </p:sp>
+      <p:sp>
+        <p:nvSpPr>
+          <p:cNvPr id="4" name="Дата 3"/>
           <p:cNvSpPr>
             <a:spLocks noGrp="1"/>
           </p:cNvSpPr>
@@ -456,17 +456,17 @@
           <a:bodyPr/>
           <a:lstStyle/>
           <a:p>
-            <a:fld id="{6BEA9FEF-F98A-47E0-9C21-541796582112}" type="datetimeFigureOut">
-              <a:rPr lang="en-US" smtClean="0"/>
-              <a:t>4/10/2019</a:t>
+            <a:fld id="{C5EFBD4B-3E12-4C3F-80E2-AB0596552E20}" type="datetimeFigureOut">
+              <a:rPr lang="ru-RU" smtClean="0"/>
+              <a:t>30.01.2020</a:t>
             </a:fld>
-            <a:endParaRPr lang="en-US"/>
-          </a:p>
-        </p:txBody>
-      </p:sp>
-      <p:sp>
-        <p:nvSpPr>
-          <p:cNvPr id="5" name="Footer Placeholder 4"/>
+            <a:endParaRPr lang="ru-RU"/>
+          </a:p>
+        </p:txBody>
+      </p:sp>
+      <p:sp>
+        <p:nvSpPr>
+          <p:cNvPr id="5" name="Нижний колонтитул 4"/>
           <p:cNvSpPr>
             <a:spLocks noGrp="1"/>
           </p:cNvSpPr>
@@ -479,13 +479,13 @@
           <a:bodyPr/>
           <a:lstStyle/>
           <a:p>
-            <a:endParaRPr lang="en-US"/>
-          </a:p>
-        </p:txBody>
-      </p:sp>
-      <p:sp>
-        <p:nvSpPr>
-          <p:cNvPr id="6" name="Slide Number Placeholder 5"/>
+            <a:endParaRPr lang="ru-RU"/>
+          </a:p>
+        </p:txBody>
+      </p:sp>
+      <p:sp>
+        <p:nvSpPr>
+          <p:cNvPr id="6" name="Номер слайда 5"/>
           <p:cNvSpPr>
             <a:spLocks noGrp="1"/>
           </p:cNvSpPr>
@@ -498,18 +498,18 @@
           <a:bodyPr/>
           <a:lstStyle/>
           <a:p>
-            <a:fld id="{69FECE0F-3224-4FD0-AD1A-6EBF0A13B0A2}" type="slidenum">
-              <a:rPr lang="en-US" smtClean="0"/>
+            <a:fld id="{36255947-ADA5-4F8E-8AAD-4E02849B2E3E}" type="slidenum">
+              <a:rPr lang="ru-RU" smtClean="0"/>
               <a:t>‹#›</a:t>
             </a:fld>
-            <a:endParaRPr lang="en-US"/>
+            <a:endParaRPr lang="ru-RU"/>
           </a:p>
         </p:txBody>
       </p:sp>
     </p:spTree>
     <p:extLst>
       <p:ext uri="{BB962C8B-B14F-4D97-AF65-F5344CB8AC3E}">
-        <p14:creationId xmlns:p14="http://schemas.microsoft.com/office/powerpoint/2010/main" val="336480146"/>
+        <p14:creationId xmlns:p14="http://schemas.microsoft.com/office/powerpoint/2010/main" val="268366527"/>
       </p:ext>
     </p:extLst>
   </p:cSld>
@@ -521,7 +521,7 @@
 
 <file path=ppt/slideLayouts/slideLayout11.xml><?xml version="1.0" encoding="utf-8"?>
 <p:sldLayout xmlns:a="http://schemas.openxmlformats.org/drawingml/2006/main" xmlns:r="http://schemas.openxmlformats.org/officeDocument/2006/relationships" xmlns:p="http://schemas.openxmlformats.org/presentationml/2006/main" type="vertTitleAndTx" preserve="1">
-  <p:cSld name="Vertical Title and Text">
+  <p:cSld name="Вертикальный заголовок и текст">
     <p:spTree>
       <p:nvGrpSpPr>
         <p:cNvPr id="1" name=""/>
@@ -538,7 +538,7 @@
       </p:grpSpPr>
       <p:sp>
         <p:nvSpPr>
-          <p:cNvPr id="2" name="Vertical Title 1"/>
+          <p:cNvPr id="2" name="Вертикальный заголовок 1"/>
           <p:cNvSpPr>
             <a:spLocks noGrp="1"/>
           </p:cNvSpPr>
@@ -557,16 +557,16 @@
           <a:lstStyle/>
           <a:p>
             <a:r>
-              <a:rPr lang="en-US" smtClean="0"/>
-              <a:t>Click to edit Master title style</a:t>
-            </a:r>
-            <a:endParaRPr lang="en-US"/>
-          </a:p>
-        </p:txBody>
-      </p:sp>
-      <p:sp>
-        <p:nvSpPr>
-          <p:cNvPr id="3" name="Vertical Text Placeholder 2"/>
+              <a:rPr lang="ru-RU" smtClean="0"/>
+              <a:t>Образец заголовка</a:t>
+            </a:r>
+            <a:endParaRPr lang="ru-RU"/>
+          </a:p>
+        </p:txBody>
+      </p:sp>
+      <p:sp>
+        <p:nvSpPr>
+          <p:cNvPr id="3" name="Вертикальный текст 2"/>
           <p:cNvSpPr>
             <a:spLocks noGrp="1"/>
           </p:cNvSpPr>
@@ -586,44 +586,44 @@
           <a:p>
             <a:pPr lvl="0"/>
             <a:r>
-              <a:rPr lang="en-US" smtClean="0"/>
-              <a:t>Click to edit Master text styles</a:t>
+              <a:rPr lang="ru-RU" smtClean="0"/>
+              <a:t>Образец текста</a:t>
             </a:r>
           </a:p>
           <a:p>
             <a:pPr lvl="1"/>
             <a:r>
-              <a:rPr lang="en-US" smtClean="0"/>
-              <a:t>Second level</a:t>
+              <a:rPr lang="ru-RU" smtClean="0"/>
+              <a:t>Второй уровень</a:t>
             </a:r>
           </a:p>
           <a:p>
             <a:pPr lvl="2"/>
             <a:r>
-              <a:rPr lang="en-US" smtClean="0"/>
-              <a:t>Third level</a:t>
+              <a:rPr lang="ru-RU" smtClean="0"/>
+              <a:t>Третий уровень</a:t>
             </a:r>
           </a:p>
           <a:p>
             <a:pPr lvl="3"/>
             <a:r>
-              <a:rPr lang="en-US" smtClean="0"/>
-              <a:t>Fourth level</a:t>
+              <a:rPr lang="ru-RU" smtClean="0"/>
+              <a:t>Четвертый уровень</a:t>
             </a:r>
           </a:p>
           <a:p>
             <a:pPr lvl="4"/>
             <a:r>
-              <a:rPr lang="en-US" smtClean="0"/>
-              <a:t>Fifth level</a:t>
-            </a:r>
-            <a:endParaRPr lang="en-US"/>
-          </a:p>
-        </p:txBody>
-      </p:sp>
-      <p:sp>
-        <p:nvSpPr>
-          <p:cNvPr id="4" name="Date Placeholder 3"/>
+              <a:rPr lang="ru-RU" smtClean="0"/>
+              <a:t>Пятый уровень</a:t>
+            </a:r>
+            <a:endParaRPr lang="ru-RU"/>
+          </a:p>
+        </p:txBody>
+      </p:sp>
+      <p:sp>
+        <p:nvSpPr>
+          <p:cNvPr id="4" name="Дата 3"/>
           <p:cNvSpPr>
             <a:spLocks noGrp="1"/>
           </p:cNvSpPr>
@@ -636,17 +636,17 @@
           <a:bodyPr/>
           <a:lstStyle/>
           <a:p>
-            <a:fld id="{6BEA9FEF-F98A-47E0-9C21-541796582112}" type="datetimeFigureOut">
-              <a:rPr lang="en-US" smtClean="0"/>
-              <a:t>4/10/2019</a:t>
+            <a:fld id="{C5EFBD4B-3E12-4C3F-80E2-AB0596552E20}" type="datetimeFigureOut">
+              <a:rPr lang="ru-RU" smtClean="0"/>
+              <a:t>30.01.2020</a:t>
             </a:fld>
-            <a:endParaRPr lang="en-US"/>
-          </a:p>
-        </p:txBody>
-      </p:sp>
-      <p:sp>
-        <p:nvSpPr>
-          <p:cNvPr id="5" name="Footer Placeholder 4"/>
+            <a:endParaRPr lang="ru-RU"/>
+          </a:p>
+        </p:txBody>
+      </p:sp>
+      <p:sp>
+        <p:nvSpPr>
+          <p:cNvPr id="5" name="Нижний колонтитул 4"/>
           <p:cNvSpPr>
             <a:spLocks noGrp="1"/>
           </p:cNvSpPr>
@@ -659,13 +659,13 @@
           <a:bodyPr/>
           <a:lstStyle/>
           <a:p>
-            <a:endParaRPr lang="en-US"/>
-          </a:p>
-        </p:txBody>
-      </p:sp>
-      <p:sp>
-        <p:nvSpPr>
-          <p:cNvPr id="6" name="Slide Number Placeholder 5"/>
+            <a:endParaRPr lang="ru-RU"/>
+          </a:p>
+        </p:txBody>
+      </p:sp>
+      <p:sp>
+        <p:nvSpPr>
+          <p:cNvPr id="6" name="Номер слайда 5"/>
           <p:cNvSpPr>
             <a:spLocks noGrp="1"/>
           </p:cNvSpPr>
@@ -678,18 +678,18 @@
           <a:bodyPr/>
           <a:lstStyle/>
           <a:p>
-            <a:fld id="{69FECE0F-3224-4FD0-AD1A-6EBF0A13B0A2}" type="slidenum">
-              <a:rPr lang="en-US" smtClean="0"/>
+            <a:fld id="{36255947-ADA5-4F8E-8AAD-4E02849B2E3E}" type="slidenum">
+              <a:rPr lang="ru-RU" smtClean="0"/>
               <a:t>‹#›</a:t>
             </a:fld>
-            <a:endParaRPr lang="en-US"/>
+            <a:endParaRPr lang="ru-RU"/>
           </a:p>
         </p:txBody>
       </p:sp>
     </p:spTree>
     <p:extLst>
       <p:ext uri="{BB962C8B-B14F-4D97-AF65-F5344CB8AC3E}">
-        <p14:creationId xmlns:p14="http://schemas.microsoft.com/office/powerpoint/2010/main" val="857095455"/>
+        <p14:creationId xmlns:p14="http://schemas.microsoft.com/office/powerpoint/2010/main" val="2103088396"/>
       </p:ext>
     </p:extLst>
   </p:cSld>
@@ -701,7 +701,7 @@
 
 <file path=ppt/slideLayouts/slideLayout2.xml><?xml version="1.0" encoding="utf-8"?>
 <p:sldLayout xmlns:a="http://schemas.openxmlformats.org/drawingml/2006/main" xmlns:r="http://schemas.openxmlformats.org/officeDocument/2006/relationships" xmlns:p="http://schemas.openxmlformats.org/presentationml/2006/main" type="obj" preserve="1">
-  <p:cSld name="Title and Content">
+  <p:cSld name="Заголовок и объект">
     <p:spTree>
       <p:nvGrpSpPr>
         <p:cNvPr id="1" name=""/>
@@ -718,7 +718,7 @@
       </p:grpSpPr>
       <p:sp>
         <p:nvSpPr>
-          <p:cNvPr id="2" name="Title 1"/>
+          <p:cNvPr id="2" name="Заголовок 1"/>
           <p:cNvSpPr>
             <a:spLocks noGrp="1"/>
           </p:cNvSpPr>
@@ -732,16 +732,16 @@
           <a:lstStyle/>
           <a:p>
             <a:r>
-              <a:rPr lang="en-US" smtClean="0"/>
-              <a:t>Click to edit Master title style</a:t>
-            </a:r>
-            <a:endParaRPr lang="en-US"/>
-          </a:p>
-        </p:txBody>
-      </p:sp>
-      <p:sp>
-        <p:nvSpPr>
-          <p:cNvPr id="3" name="Content Placeholder 2"/>
+              <a:rPr lang="ru-RU" smtClean="0"/>
+              <a:t>Образец заголовка</a:t>
+            </a:r>
+            <a:endParaRPr lang="ru-RU"/>
+          </a:p>
+        </p:txBody>
+      </p:sp>
+      <p:sp>
+        <p:nvSpPr>
+          <p:cNvPr id="3" name="Объект 2"/>
           <p:cNvSpPr>
             <a:spLocks noGrp="1"/>
           </p:cNvSpPr>
@@ -756,44 +756,44 @@
           <a:p>
             <a:pPr lvl="0"/>
             <a:r>
-              <a:rPr lang="en-US" smtClean="0"/>
-              <a:t>Click to edit Master text styles</a:t>
+              <a:rPr lang="ru-RU" smtClean="0"/>
+              <a:t>Образец текста</a:t>
             </a:r>
           </a:p>
           <a:p>
             <a:pPr lvl="1"/>
             <a:r>
-              <a:rPr lang="en-US" smtClean="0"/>
-              <a:t>Second level</a:t>
+              <a:rPr lang="ru-RU" smtClean="0"/>
+              <a:t>Второй уровень</a:t>
             </a:r>
           </a:p>
           <a:p>
             <a:pPr lvl="2"/>
             <a:r>
-              <a:rPr lang="en-US" smtClean="0"/>
-              <a:t>Third level</a:t>
+              <a:rPr lang="ru-RU" smtClean="0"/>
+              <a:t>Третий уровень</a:t>
             </a:r>
           </a:p>
           <a:p>
             <a:pPr lvl="3"/>
             <a:r>
-              <a:rPr lang="en-US" smtClean="0"/>
-              <a:t>Fourth level</a:t>
+              <a:rPr lang="ru-RU" smtClean="0"/>
+              <a:t>Четвертый уровень</a:t>
             </a:r>
           </a:p>
           <a:p>
             <a:pPr lvl="4"/>
             <a:r>
-              <a:rPr lang="en-US" smtClean="0"/>
-              <a:t>Fifth level</a:t>
-            </a:r>
-            <a:endParaRPr lang="en-US"/>
-          </a:p>
-        </p:txBody>
-      </p:sp>
-      <p:sp>
-        <p:nvSpPr>
-          <p:cNvPr id="4" name="Date Placeholder 3"/>
+              <a:rPr lang="ru-RU" smtClean="0"/>
+              <a:t>Пятый уровень</a:t>
+            </a:r>
+            <a:endParaRPr lang="ru-RU"/>
+          </a:p>
+        </p:txBody>
+      </p:sp>
+      <p:sp>
+        <p:nvSpPr>
+          <p:cNvPr id="4" name="Дата 3"/>
           <p:cNvSpPr>
             <a:spLocks noGrp="1"/>
           </p:cNvSpPr>
@@ -806,17 +806,17 @@
           <a:bodyPr/>
           <a:lstStyle/>
           <a:p>
-            <a:fld id="{6BEA9FEF-F98A-47E0-9C21-541796582112}" type="datetimeFigureOut">
-              <a:rPr lang="en-US" smtClean="0"/>
-              <a:t>4/10/2019</a:t>
+            <a:fld id="{C5EFBD4B-3E12-4C3F-80E2-AB0596552E20}" type="datetimeFigureOut">
+              <a:rPr lang="ru-RU" smtClean="0"/>
+              <a:t>30.01.2020</a:t>
             </a:fld>
-            <a:endParaRPr lang="en-US"/>
-          </a:p>
-        </p:txBody>
-      </p:sp>
-      <p:sp>
-        <p:nvSpPr>
-          <p:cNvPr id="5" name="Footer Placeholder 4"/>
+            <a:endParaRPr lang="ru-RU"/>
+          </a:p>
+        </p:txBody>
+      </p:sp>
+      <p:sp>
+        <p:nvSpPr>
+          <p:cNvPr id="5" name="Нижний колонтитул 4"/>
           <p:cNvSpPr>
             <a:spLocks noGrp="1"/>
           </p:cNvSpPr>
@@ -829,13 +829,13 @@
           <a:bodyPr/>
           <a:lstStyle/>
           <a:p>
-            <a:endParaRPr lang="en-US"/>
-          </a:p>
-        </p:txBody>
-      </p:sp>
-      <p:sp>
-        <p:nvSpPr>
-          <p:cNvPr id="6" name="Slide Number Placeholder 5"/>
+            <a:endParaRPr lang="ru-RU"/>
+          </a:p>
+        </p:txBody>
+      </p:sp>
+      <p:sp>
+        <p:nvSpPr>
+          <p:cNvPr id="6" name="Номер слайда 5"/>
           <p:cNvSpPr>
             <a:spLocks noGrp="1"/>
           </p:cNvSpPr>
@@ -848,18 +848,18 @@
           <a:bodyPr/>
           <a:lstStyle/>
           <a:p>
-            <a:fld id="{69FECE0F-3224-4FD0-AD1A-6EBF0A13B0A2}" type="slidenum">
-              <a:rPr lang="en-US" smtClean="0"/>
+            <a:fld id="{36255947-ADA5-4F8E-8AAD-4E02849B2E3E}" type="slidenum">
+              <a:rPr lang="ru-RU" smtClean="0"/>
               <a:t>‹#›</a:t>
             </a:fld>
-            <a:endParaRPr lang="en-US"/>
+            <a:endParaRPr lang="ru-RU"/>
           </a:p>
         </p:txBody>
       </p:sp>
     </p:spTree>
     <p:extLst>
       <p:ext uri="{BB962C8B-B14F-4D97-AF65-F5344CB8AC3E}">
-        <p14:creationId xmlns:p14="http://schemas.microsoft.com/office/powerpoint/2010/main" val="3511830689"/>
+        <p14:creationId xmlns:p14="http://schemas.microsoft.com/office/powerpoint/2010/main" val="2780319662"/>
       </p:ext>
     </p:extLst>
   </p:cSld>
@@ -871,7 +871,7 @@
 
 <file path=ppt/slideLayouts/slideLayout3.xml><?xml version="1.0" encoding="utf-8"?>
 <p:sldLayout xmlns:a="http://schemas.openxmlformats.org/drawingml/2006/main" xmlns:r="http://schemas.openxmlformats.org/officeDocument/2006/relationships" xmlns:p="http://schemas.openxmlformats.org/presentationml/2006/main" type="secHead" preserve="1">
-  <p:cSld name="Section Header">
+  <p:cSld name="Заголовок раздела">
     <p:spTree>
       <p:nvGrpSpPr>
         <p:cNvPr id="1" name=""/>
@@ -888,7 +888,7 @@
       </p:grpSpPr>
       <p:sp>
         <p:nvSpPr>
-          <p:cNvPr id="2" name="Title 1"/>
+          <p:cNvPr id="2" name="Заголовок 1"/>
           <p:cNvSpPr>
             <a:spLocks noGrp="1"/>
           </p:cNvSpPr>
@@ -911,16 +911,16 @@
           </a:lstStyle>
           <a:p>
             <a:r>
-              <a:rPr lang="en-US" smtClean="0"/>
-              <a:t>Click to edit Master title style</a:t>
-            </a:r>
-            <a:endParaRPr lang="en-US"/>
-          </a:p>
-        </p:txBody>
-      </p:sp>
-      <p:sp>
-        <p:nvSpPr>
-          <p:cNvPr id="3" name="Text Placeholder 2"/>
+              <a:rPr lang="ru-RU" smtClean="0"/>
+              <a:t>Образец заголовка</a:t>
+            </a:r>
+            <a:endParaRPr lang="ru-RU"/>
+          </a:p>
+        </p:txBody>
+      </p:sp>
+      <p:sp>
+        <p:nvSpPr>
+          <p:cNvPr id="3" name="Текст 2"/>
           <p:cNvSpPr>
             <a:spLocks noGrp="1"/>
           </p:cNvSpPr>
@@ -1031,15 +1031,15 @@
           <a:p>
             <a:pPr lvl="0"/>
             <a:r>
-              <a:rPr lang="en-US" smtClean="0"/>
-              <a:t>Click to edit Master text styles</a:t>
-            </a:r>
-          </a:p>
-        </p:txBody>
-      </p:sp>
-      <p:sp>
-        <p:nvSpPr>
-          <p:cNvPr id="4" name="Date Placeholder 3"/>
+              <a:rPr lang="ru-RU" smtClean="0"/>
+              <a:t>Образец текста</a:t>
+            </a:r>
+          </a:p>
+        </p:txBody>
+      </p:sp>
+      <p:sp>
+        <p:nvSpPr>
+          <p:cNvPr id="4" name="Дата 3"/>
           <p:cNvSpPr>
             <a:spLocks noGrp="1"/>
           </p:cNvSpPr>
@@ -1052,17 +1052,17 @@
           <a:bodyPr/>
           <a:lstStyle/>
           <a:p>
-            <a:fld id="{6BEA9FEF-F98A-47E0-9C21-541796582112}" type="datetimeFigureOut">
-              <a:rPr lang="en-US" smtClean="0"/>
-              <a:t>4/10/2019</a:t>
+            <a:fld id="{C5EFBD4B-3E12-4C3F-80E2-AB0596552E20}" type="datetimeFigureOut">
+              <a:rPr lang="ru-RU" smtClean="0"/>
+              <a:t>30.01.2020</a:t>
             </a:fld>
-            <a:endParaRPr lang="en-US"/>
-          </a:p>
-        </p:txBody>
-      </p:sp>
-      <p:sp>
-        <p:nvSpPr>
-          <p:cNvPr id="5" name="Footer Placeholder 4"/>
+            <a:endParaRPr lang="ru-RU"/>
+          </a:p>
+        </p:txBody>
+      </p:sp>
+      <p:sp>
+        <p:nvSpPr>
+          <p:cNvPr id="5" name="Нижний колонтитул 4"/>
           <p:cNvSpPr>
             <a:spLocks noGrp="1"/>
           </p:cNvSpPr>
@@ -1075,13 +1075,13 @@
           <a:bodyPr/>
           <a:lstStyle/>
           <a:p>
-            <a:endParaRPr lang="en-US"/>
-          </a:p>
-        </p:txBody>
-      </p:sp>
-      <p:sp>
-        <p:nvSpPr>
-          <p:cNvPr id="6" name="Slide Number Placeholder 5"/>
+            <a:endParaRPr lang="ru-RU"/>
+          </a:p>
+        </p:txBody>
+      </p:sp>
+      <p:sp>
+        <p:nvSpPr>
+          <p:cNvPr id="6" name="Номер слайда 5"/>
           <p:cNvSpPr>
             <a:spLocks noGrp="1"/>
           </p:cNvSpPr>
@@ -1094,18 +1094,18 @@
           <a:bodyPr/>
           <a:lstStyle/>
           <a:p>
-            <a:fld id="{69FECE0F-3224-4FD0-AD1A-6EBF0A13B0A2}" type="slidenum">
-              <a:rPr lang="en-US" smtClean="0"/>
+            <a:fld id="{36255947-ADA5-4F8E-8AAD-4E02849B2E3E}" type="slidenum">
+              <a:rPr lang="ru-RU" smtClean="0"/>
               <a:t>‹#›</a:t>
             </a:fld>
-            <a:endParaRPr lang="en-US"/>
+            <a:endParaRPr lang="ru-RU"/>
           </a:p>
         </p:txBody>
       </p:sp>
     </p:spTree>
     <p:extLst>
       <p:ext uri="{BB962C8B-B14F-4D97-AF65-F5344CB8AC3E}">
-        <p14:creationId xmlns:p14="http://schemas.microsoft.com/office/powerpoint/2010/main" val="148091869"/>
+        <p14:creationId xmlns:p14="http://schemas.microsoft.com/office/powerpoint/2010/main" val="437319843"/>
       </p:ext>
     </p:extLst>
   </p:cSld>
@@ -1117,7 +1117,7 @@
 
 <file path=ppt/slideLayouts/slideLayout4.xml><?xml version="1.0" encoding="utf-8"?>
 <p:sldLayout xmlns:a="http://schemas.openxmlformats.org/drawingml/2006/main" xmlns:r="http://schemas.openxmlformats.org/officeDocument/2006/relationships" xmlns:p="http://schemas.openxmlformats.org/presentationml/2006/main" type="twoObj" preserve="1">
-  <p:cSld name="Two Content">
+  <p:cSld name="Два объекта">
     <p:spTree>
       <p:nvGrpSpPr>
         <p:cNvPr id="1" name=""/>
@@ -1134,7 +1134,7 @@
       </p:grpSpPr>
       <p:sp>
         <p:nvSpPr>
-          <p:cNvPr id="2" name="Title 1"/>
+          <p:cNvPr id="2" name="Заголовок 1"/>
           <p:cNvSpPr>
             <a:spLocks noGrp="1"/>
           </p:cNvSpPr>
@@ -1148,16 +1148,16 @@
           <a:lstStyle/>
           <a:p>
             <a:r>
-              <a:rPr lang="en-US" smtClean="0"/>
-              <a:t>Click to edit Master title style</a:t>
-            </a:r>
-            <a:endParaRPr lang="en-US"/>
-          </a:p>
-        </p:txBody>
-      </p:sp>
-      <p:sp>
-        <p:nvSpPr>
-          <p:cNvPr id="3" name="Content Placeholder 2"/>
+              <a:rPr lang="ru-RU" smtClean="0"/>
+              <a:t>Образец заголовка</a:t>
+            </a:r>
+            <a:endParaRPr lang="ru-RU"/>
+          </a:p>
+        </p:txBody>
+      </p:sp>
+      <p:sp>
+        <p:nvSpPr>
+          <p:cNvPr id="3" name="Объект 2"/>
           <p:cNvSpPr>
             <a:spLocks noGrp="1"/>
           </p:cNvSpPr>
@@ -1205,44 +1205,44 @@
           <a:p>
             <a:pPr lvl="0"/>
             <a:r>
-              <a:rPr lang="en-US" smtClean="0"/>
-              <a:t>Click to edit Master text styles</a:t>
+              <a:rPr lang="ru-RU" smtClean="0"/>
+              <a:t>Образец текста</a:t>
             </a:r>
           </a:p>
           <a:p>
             <a:pPr lvl="1"/>
             <a:r>
-              <a:rPr lang="en-US" smtClean="0"/>
-              <a:t>Second level</a:t>
+              <a:rPr lang="ru-RU" smtClean="0"/>
+              <a:t>Второй уровень</a:t>
             </a:r>
           </a:p>
           <a:p>
             <a:pPr lvl="2"/>
             <a:r>
-              <a:rPr lang="en-US" smtClean="0"/>
-              <a:t>Third level</a:t>
+              <a:rPr lang="ru-RU" smtClean="0"/>
+              <a:t>Третий уровень</a:t>
             </a:r>
           </a:p>
           <a:p>
             <a:pPr lvl="3"/>
             <a:r>
-              <a:rPr lang="en-US" smtClean="0"/>
-              <a:t>Fourth level</a:t>
+              <a:rPr lang="ru-RU" smtClean="0"/>
+              <a:t>Четвертый уровень</a:t>
             </a:r>
           </a:p>
           <a:p>
             <a:pPr lvl="4"/>
             <a:r>
-              <a:rPr lang="en-US" smtClean="0"/>
-              <a:t>Fifth level</a:t>
-            </a:r>
-            <a:endParaRPr lang="en-US"/>
-          </a:p>
-        </p:txBody>
-      </p:sp>
-      <p:sp>
-        <p:nvSpPr>
-          <p:cNvPr id="4" name="Content Placeholder 3"/>
+              <a:rPr lang="ru-RU" smtClean="0"/>
+              <a:t>Пятый уровень</a:t>
+            </a:r>
+            <a:endParaRPr lang="ru-RU"/>
+          </a:p>
+        </p:txBody>
+      </p:sp>
+      <p:sp>
+        <p:nvSpPr>
+          <p:cNvPr id="4" name="Объект 3"/>
           <p:cNvSpPr>
             <a:spLocks noGrp="1"/>
           </p:cNvSpPr>
@@ -1290,44 +1290,44 @@
           <a:p>
             <a:pPr lvl="0"/>
             <a:r>
-              <a:rPr lang="en-US" smtClean="0"/>
-              <a:t>Click to edit Master text styles</a:t>
+              <a:rPr lang="ru-RU" smtClean="0"/>
+              <a:t>Образец текста</a:t>
             </a:r>
           </a:p>
           <a:p>
             <a:pPr lvl="1"/>
             <a:r>
-              <a:rPr lang="en-US" smtClean="0"/>
-              <a:t>Second level</a:t>
+              <a:rPr lang="ru-RU" smtClean="0"/>
+              <a:t>Второй уровень</a:t>
             </a:r>
           </a:p>
           <a:p>
             <a:pPr lvl="2"/>
             <a:r>
-              <a:rPr lang="en-US" smtClean="0"/>
-              <a:t>Third level</a:t>
+              <a:rPr lang="ru-RU" smtClean="0"/>
+              <a:t>Третий уровень</a:t>
             </a:r>
           </a:p>
           <a:p>
             <a:pPr lvl="3"/>
             <a:r>
-              <a:rPr lang="en-US" smtClean="0"/>
-              <a:t>Fourth level</a:t>
+              <a:rPr lang="ru-RU" smtClean="0"/>
+              <a:t>Четвертый уровень</a:t>
             </a:r>
           </a:p>
           <a:p>
             <a:pPr lvl="4"/>
             <a:r>
-              <a:rPr lang="en-US" smtClean="0"/>
-              <a:t>Fifth level</a:t>
-            </a:r>
-            <a:endParaRPr lang="en-US"/>
-          </a:p>
-        </p:txBody>
-      </p:sp>
-      <p:sp>
-        <p:nvSpPr>
-          <p:cNvPr id="5" name="Date Placeholder 4"/>
+              <a:rPr lang="ru-RU" smtClean="0"/>
+              <a:t>Пятый уровень</a:t>
+            </a:r>
+            <a:endParaRPr lang="ru-RU"/>
+          </a:p>
+        </p:txBody>
+      </p:sp>
+      <p:sp>
+        <p:nvSpPr>
+          <p:cNvPr id="5" name="Дата 4"/>
           <p:cNvSpPr>
             <a:spLocks noGrp="1"/>
           </p:cNvSpPr>
@@ -1340,17 +1340,17 @@
           <a:bodyPr/>
           <a:lstStyle/>
           <a:p>
-            <a:fld id="{6BEA9FEF-F98A-47E0-9C21-541796582112}" type="datetimeFigureOut">
-              <a:rPr lang="en-US" smtClean="0"/>
-              <a:t>4/10/2019</a:t>
+            <a:fld id="{C5EFBD4B-3E12-4C3F-80E2-AB0596552E20}" type="datetimeFigureOut">
+              <a:rPr lang="ru-RU" smtClean="0"/>
+              <a:t>30.01.2020</a:t>
             </a:fld>
-            <a:endParaRPr lang="en-US"/>
-          </a:p>
-        </p:txBody>
-      </p:sp>
-      <p:sp>
-        <p:nvSpPr>
-          <p:cNvPr id="6" name="Footer Placeholder 5"/>
+            <a:endParaRPr lang="ru-RU"/>
+          </a:p>
+        </p:txBody>
+      </p:sp>
+      <p:sp>
+        <p:nvSpPr>
+          <p:cNvPr id="6" name="Нижний колонтитул 5"/>
           <p:cNvSpPr>
             <a:spLocks noGrp="1"/>
           </p:cNvSpPr>
@@ -1363,13 +1363,13 @@
           <a:bodyPr/>
           <a:lstStyle/>
           <a:p>
-            <a:endParaRPr lang="en-US"/>
-          </a:p>
-        </p:txBody>
-      </p:sp>
-      <p:sp>
-        <p:nvSpPr>
-          <p:cNvPr id="7" name="Slide Number Placeholder 6"/>
+            <a:endParaRPr lang="ru-RU"/>
+          </a:p>
+        </p:txBody>
+      </p:sp>
+      <p:sp>
+        <p:nvSpPr>
+          <p:cNvPr id="7" name="Номер слайда 6"/>
           <p:cNvSpPr>
             <a:spLocks noGrp="1"/>
           </p:cNvSpPr>
@@ -1382,18 +1382,18 @@
           <a:bodyPr/>
           <a:lstStyle/>
           <a:p>
-            <a:fld id="{69FECE0F-3224-4FD0-AD1A-6EBF0A13B0A2}" type="slidenum">
-              <a:rPr lang="en-US" smtClean="0"/>
+            <a:fld id="{36255947-ADA5-4F8E-8AAD-4E02849B2E3E}" type="slidenum">
+              <a:rPr lang="ru-RU" smtClean="0"/>
               <a:t>‹#›</a:t>
             </a:fld>
-            <a:endParaRPr lang="en-US"/>
+            <a:endParaRPr lang="ru-RU"/>
           </a:p>
         </p:txBody>
       </p:sp>
     </p:spTree>
     <p:extLst>
       <p:ext uri="{BB962C8B-B14F-4D97-AF65-F5344CB8AC3E}">
-        <p14:creationId xmlns:p14="http://schemas.microsoft.com/office/powerpoint/2010/main" val="2360529211"/>
+        <p14:creationId xmlns:p14="http://schemas.microsoft.com/office/powerpoint/2010/main" val="3974853151"/>
       </p:ext>
     </p:extLst>
   </p:cSld>
@@ -1405,7 +1405,7 @@
 
 <file path=ppt/slideLayouts/slideLayout5.xml><?xml version="1.0" encoding="utf-8"?>
 <p:sldLayout xmlns:a="http://schemas.openxmlformats.org/drawingml/2006/main" xmlns:r="http://schemas.openxmlformats.org/officeDocument/2006/relationships" xmlns:p="http://schemas.openxmlformats.org/presentationml/2006/main" type="twoTxTwoObj" preserve="1">
-  <p:cSld name="Comparison">
+  <p:cSld name="Сравнение">
     <p:spTree>
       <p:nvGrpSpPr>
         <p:cNvPr id="1" name=""/>
@@ -1422,7 +1422,7 @@
       </p:grpSpPr>
       <p:sp>
         <p:nvSpPr>
-          <p:cNvPr id="2" name="Title 1"/>
+          <p:cNvPr id="2" name="Заголовок 1"/>
           <p:cNvSpPr>
             <a:spLocks noGrp="1"/>
           </p:cNvSpPr>
@@ -1440,16 +1440,16 @@
           </a:lstStyle>
           <a:p>
             <a:r>
-              <a:rPr lang="en-US" smtClean="0"/>
-              <a:t>Click to edit Master title style</a:t>
-            </a:r>
-            <a:endParaRPr lang="en-US"/>
-          </a:p>
-        </p:txBody>
-      </p:sp>
-      <p:sp>
-        <p:nvSpPr>
-          <p:cNvPr id="3" name="Text Placeholder 2"/>
+              <a:rPr lang="ru-RU" smtClean="0"/>
+              <a:t>Образец заголовка</a:t>
+            </a:r>
+            <a:endParaRPr lang="ru-RU"/>
+          </a:p>
+        </p:txBody>
+      </p:sp>
+      <p:sp>
+        <p:nvSpPr>
+          <p:cNvPr id="3" name="Текст 2"/>
           <p:cNvSpPr>
             <a:spLocks noGrp="1"/>
           </p:cNvSpPr>
@@ -1506,15 +1506,15 @@
           <a:p>
             <a:pPr lvl="0"/>
             <a:r>
-              <a:rPr lang="en-US" smtClean="0"/>
-              <a:t>Click to edit Master text styles</a:t>
-            </a:r>
-          </a:p>
-        </p:txBody>
-      </p:sp>
-      <p:sp>
-        <p:nvSpPr>
-          <p:cNvPr id="4" name="Content Placeholder 3"/>
+              <a:rPr lang="ru-RU" smtClean="0"/>
+              <a:t>Образец текста</a:t>
+            </a:r>
+          </a:p>
+        </p:txBody>
+      </p:sp>
+      <p:sp>
+        <p:nvSpPr>
+          <p:cNvPr id="4" name="Объект 3"/>
           <p:cNvSpPr>
             <a:spLocks noGrp="1"/>
           </p:cNvSpPr>
@@ -1562,44 +1562,44 @@
           <a:p>
             <a:pPr lvl="0"/>
             <a:r>
-              <a:rPr lang="en-US" smtClean="0"/>
-              <a:t>Click to edit Master text styles</a:t>
+              <a:rPr lang="ru-RU" smtClean="0"/>
+              <a:t>Образец текста</a:t>
             </a:r>
           </a:p>
           <a:p>
             <a:pPr lvl="1"/>
             <a:r>
-              <a:rPr lang="en-US" smtClean="0"/>
-              <a:t>Second level</a:t>
+              <a:rPr lang="ru-RU" smtClean="0"/>
+              <a:t>Второй уровень</a:t>
             </a:r>
           </a:p>
           <a:p>
             <a:pPr lvl="2"/>
             <a:r>
-              <a:rPr lang="en-US" smtClean="0"/>
-              <a:t>Third level</a:t>
+              <a:rPr lang="ru-RU" smtClean="0"/>
+              <a:t>Третий уровень</a:t>
             </a:r>
           </a:p>
           <a:p>
             <a:pPr lvl="3"/>
             <a:r>
-              <a:rPr lang="en-US" smtClean="0"/>
-              <a:t>Fourth level</a:t>
+              <a:rPr lang="ru-RU" smtClean="0"/>
+              <a:t>Четвертый уровень</a:t>
             </a:r>
           </a:p>
           <a:p>
             <a:pPr lvl="4"/>
             <a:r>
-              <a:rPr lang="en-US" smtClean="0"/>
-              <a:t>Fifth level</a:t>
-            </a:r>
-            <a:endParaRPr lang="en-US"/>
-          </a:p>
-        </p:txBody>
-      </p:sp>
-      <p:sp>
-        <p:nvSpPr>
-          <p:cNvPr id="5" name="Text Placeholder 4"/>
+              <a:rPr lang="ru-RU" smtClean="0"/>
+              <a:t>Пятый уровень</a:t>
+            </a:r>
+            <a:endParaRPr lang="ru-RU"/>
+          </a:p>
+        </p:txBody>
+      </p:sp>
+      <p:sp>
+        <p:nvSpPr>
+          <p:cNvPr id="5" name="Текст 4"/>
           <p:cNvSpPr>
             <a:spLocks noGrp="1"/>
           </p:cNvSpPr>
@@ -1656,15 +1656,15 @@
           <a:p>
             <a:pPr lvl="0"/>
             <a:r>
-              <a:rPr lang="en-US" smtClean="0"/>
-              <a:t>Click to edit Master text styles</a:t>
-            </a:r>
-          </a:p>
-        </p:txBody>
-      </p:sp>
-      <p:sp>
-        <p:nvSpPr>
-          <p:cNvPr id="6" name="Content Placeholder 5"/>
+              <a:rPr lang="ru-RU" smtClean="0"/>
+              <a:t>Образец текста</a:t>
+            </a:r>
+          </a:p>
+        </p:txBody>
+      </p:sp>
+      <p:sp>
+        <p:nvSpPr>
+          <p:cNvPr id="6" name="Объект 5"/>
           <p:cNvSpPr>
             <a:spLocks noGrp="1"/>
           </p:cNvSpPr>
@@ -1712,44 +1712,44 @@
           <a:p>
             <a:pPr lvl="0"/>
             <a:r>
-              <a:rPr lang="en-US" smtClean="0"/>
-              <a:t>Click to edit Master text styles</a:t>
+              <a:rPr lang="ru-RU" smtClean="0"/>
+              <a:t>Образец текста</a:t>
             </a:r>
           </a:p>
           <a:p>
             <a:pPr lvl="1"/>
             <a:r>
-              <a:rPr lang="en-US" smtClean="0"/>
-              <a:t>Second level</a:t>
+              <a:rPr lang="ru-RU" smtClean="0"/>
+              <a:t>Второй уровень</a:t>
             </a:r>
           </a:p>
           <a:p>
             <a:pPr lvl="2"/>
             <a:r>
-              <a:rPr lang="en-US" smtClean="0"/>
-              <a:t>Third level</a:t>
+              <a:rPr lang="ru-RU" smtClean="0"/>
+              <a:t>Третий уровень</a:t>
             </a:r>
           </a:p>
           <a:p>
             <a:pPr lvl="3"/>
             <a:r>
-              <a:rPr lang="en-US" smtClean="0"/>
-              <a:t>Fourth level</a:t>
+              <a:rPr lang="ru-RU" smtClean="0"/>
+              <a:t>Четвертый уровень</a:t>
             </a:r>
           </a:p>
           <a:p>
             <a:pPr lvl="4"/>
             <a:r>
-              <a:rPr lang="en-US" smtClean="0"/>
-              <a:t>Fifth level</a:t>
-            </a:r>
-            <a:endParaRPr lang="en-US"/>
-          </a:p>
-        </p:txBody>
-      </p:sp>
-      <p:sp>
-        <p:nvSpPr>
-          <p:cNvPr id="7" name="Date Placeholder 6"/>
+              <a:rPr lang="ru-RU" smtClean="0"/>
+              <a:t>Пятый уровень</a:t>
+            </a:r>
+            <a:endParaRPr lang="ru-RU"/>
+          </a:p>
+        </p:txBody>
+      </p:sp>
+      <p:sp>
+        <p:nvSpPr>
+          <p:cNvPr id="7" name="Дата 6"/>
           <p:cNvSpPr>
             <a:spLocks noGrp="1"/>
           </p:cNvSpPr>
@@ -1762,17 +1762,17 @@
           <a:bodyPr/>
           <a:lstStyle/>
           <a:p>
-            <a:fld id="{6BEA9FEF-F98A-47E0-9C21-541796582112}" type="datetimeFigureOut">
-              <a:rPr lang="en-US" smtClean="0"/>
-              <a:t>4/10/2019</a:t>
+            <a:fld id="{C5EFBD4B-3E12-4C3F-80E2-AB0596552E20}" type="datetimeFigureOut">
+              <a:rPr lang="ru-RU" smtClean="0"/>
+              <a:t>30.01.2020</a:t>
             </a:fld>
-            <a:endParaRPr lang="en-US"/>
-          </a:p>
-        </p:txBody>
-      </p:sp>
-      <p:sp>
-        <p:nvSpPr>
-          <p:cNvPr id="8" name="Footer Placeholder 7"/>
+            <a:endParaRPr lang="ru-RU"/>
+          </a:p>
+        </p:txBody>
+      </p:sp>
+      <p:sp>
+        <p:nvSpPr>
+          <p:cNvPr id="8" name="Нижний колонтитул 7"/>
           <p:cNvSpPr>
             <a:spLocks noGrp="1"/>
           </p:cNvSpPr>
@@ -1785,13 +1785,13 @@
           <a:bodyPr/>
           <a:lstStyle/>
           <a:p>
-            <a:endParaRPr lang="en-US"/>
-          </a:p>
-        </p:txBody>
-      </p:sp>
-      <p:sp>
-        <p:nvSpPr>
-          <p:cNvPr id="9" name="Slide Number Placeholder 8"/>
+            <a:endParaRPr lang="ru-RU"/>
+          </a:p>
+        </p:txBody>
+      </p:sp>
+      <p:sp>
+        <p:nvSpPr>
+          <p:cNvPr id="9" name="Номер слайда 8"/>
           <p:cNvSpPr>
             <a:spLocks noGrp="1"/>
           </p:cNvSpPr>
@@ -1804,18 +1804,18 @@
           <a:bodyPr/>
           <a:lstStyle/>
           <a:p>
-            <a:fld id="{69FECE0F-3224-4FD0-AD1A-6EBF0A13B0A2}" type="slidenum">
-              <a:rPr lang="en-US" smtClean="0"/>
+            <a:fld id="{36255947-ADA5-4F8E-8AAD-4E02849B2E3E}" type="slidenum">
+              <a:rPr lang="ru-RU" smtClean="0"/>
               <a:t>‹#›</a:t>
             </a:fld>
-            <a:endParaRPr lang="en-US"/>
+            <a:endParaRPr lang="ru-RU"/>
           </a:p>
         </p:txBody>
       </p:sp>
     </p:spTree>
     <p:extLst>
       <p:ext uri="{BB962C8B-B14F-4D97-AF65-F5344CB8AC3E}">
-        <p14:creationId xmlns:p14="http://schemas.microsoft.com/office/powerpoint/2010/main" val="1511708940"/>
+        <p14:creationId xmlns:p14="http://schemas.microsoft.com/office/powerpoint/2010/main" val="2033556282"/>
       </p:ext>
     </p:extLst>
   </p:cSld>
@@ -1827,7 +1827,7 @@
 
 <file path=ppt/slideLayouts/slideLayout6.xml><?xml version="1.0" encoding="utf-8"?>
 <p:sldLayout xmlns:a="http://schemas.openxmlformats.org/drawingml/2006/main" xmlns:r="http://schemas.openxmlformats.org/officeDocument/2006/relationships" xmlns:p="http://schemas.openxmlformats.org/presentationml/2006/main" type="titleOnly" preserve="1">
-  <p:cSld name="Title Only">
+  <p:cSld name="Только заголовок">
     <p:spTree>
       <p:nvGrpSpPr>
         <p:cNvPr id="1" name=""/>
@@ -1844,7 +1844,7 @@
       </p:grpSpPr>
       <p:sp>
         <p:nvSpPr>
-          <p:cNvPr id="2" name="Title 1"/>
+          <p:cNvPr id="2" name="Заголовок 1"/>
           <p:cNvSpPr>
             <a:spLocks noGrp="1"/>
           </p:cNvSpPr>
@@ -1858,16 +1858,16 @@
           <a:lstStyle/>
           <a:p>
             <a:r>
-              <a:rPr lang="en-US" smtClean="0"/>
-              <a:t>Click to edit Master title style</a:t>
-            </a:r>
-            <a:endParaRPr lang="en-US"/>
-          </a:p>
-        </p:txBody>
-      </p:sp>
-      <p:sp>
-        <p:nvSpPr>
-          <p:cNvPr id="3" name="Date Placeholder 2"/>
+              <a:rPr lang="ru-RU" smtClean="0"/>
+              <a:t>Образец заголовка</a:t>
+            </a:r>
+            <a:endParaRPr lang="ru-RU"/>
+          </a:p>
+        </p:txBody>
+      </p:sp>
+      <p:sp>
+        <p:nvSpPr>
+          <p:cNvPr id="3" name="Дата 2"/>
           <p:cNvSpPr>
             <a:spLocks noGrp="1"/>
           </p:cNvSpPr>
@@ -1880,17 +1880,17 @@
           <a:bodyPr/>
           <a:lstStyle/>
           <a:p>
-            <a:fld id="{6BEA9FEF-F98A-47E0-9C21-541796582112}" type="datetimeFigureOut">
-              <a:rPr lang="en-US" smtClean="0"/>
-              <a:t>4/10/2019</a:t>
+            <a:fld id="{C5EFBD4B-3E12-4C3F-80E2-AB0596552E20}" type="datetimeFigureOut">
+              <a:rPr lang="ru-RU" smtClean="0"/>
+              <a:t>30.01.2020</a:t>
             </a:fld>
-            <a:endParaRPr lang="en-US"/>
-          </a:p>
-        </p:txBody>
-      </p:sp>
-      <p:sp>
-        <p:nvSpPr>
-          <p:cNvPr id="4" name="Footer Placeholder 3"/>
+            <a:endParaRPr lang="ru-RU"/>
+          </a:p>
+        </p:txBody>
+      </p:sp>
+      <p:sp>
+        <p:nvSpPr>
+          <p:cNvPr id="4" name="Нижний колонтитул 3"/>
           <p:cNvSpPr>
             <a:spLocks noGrp="1"/>
           </p:cNvSpPr>
@@ -1903,13 +1903,13 @@
           <a:bodyPr/>
           <a:lstStyle/>
           <a:p>
-            <a:endParaRPr lang="en-US"/>
-          </a:p>
-        </p:txBody>
-      </p:sp>
-      <p:sp>
-        <p:nvSpPr>
-          <p:cNvPr id="5" name="Slide Number Placeholder 4"/>
+            <a:endParaRPr lang="ru-RU"/>
+          </a:p>
+        </p:txBody>
+      </p:sp>
+      <p:sp>
+        <p:nvSpPr>
+          <p:cNvPr id="5" name="Номер слайда 4"/>
           <p:cNvSpPr>
             <a:spLocks noGrp="1"/>
           </p:cNvSpPr>
@@ -1922,18 +1922,18 @@
           <a:bodyPr/>
           <a:lstStyle/>
           <a:p>
-            <a:fld id="{69FECE0F-3224-4FD0-AD1A-6EBF0A13B0A2}" type="slidenum">
-              <a:rPr lang="en-US" smtClean="0"/>
+            <a:fld id="{36255947-ADA5-4F8E-8AAD-4E02849B2E3E}" type="slidenum">
+              <a:rPr lang="ru-RU" smtClean="0"/>
               <a:t>‹#›</a:t>
             </a:fld>
-            <a:endParaRPr lang="en-US"/>
+            <a:endParaRPr lang="ru-RU"/>
           </a:p>
         </p:txBody>
       </p:sp>
     </p:spTree>
     <p:extLst>
       <p:ext uri="{BB962C8B-B14F-4D97-AF65-F5344CB8AC3E}">
-        <p14:creationId xmlns:p14="http://schemas.microsoft.com/office/powerpoint/2010/main" val="95560598"/>
+        <p14:creationId xmlns:p14="http://schemas.microsoft.com/office/powerpoint/2010/main" val="275847713"/>
       </p:ext>
     </p:extLst>
   </p:cSld>
@@ -1945,7 +1945,7 @@
 
 <file path=ppt/slideLayouts/slideLayout7.xml><?xml version="1.0" encoding="utf-8"?>
 <p:sldLayout xmlns:a="http://schemas.openxmlformats.org/drawingml/2006/main" xmlns:r="http://schemas.openxmlformats.org/officeDocument/2006/relationships" xmlns:p="http://schemas.openxmlformats.org/presentationml/2006/main" type="blank" preserve="1">
-  <p:cSld name="Blank">
+  <p:cSld name="Пустой слайд">
     <p:spTree>
       <p:nvGrpSpPr>
         <p:cNvPr id="1" name=""/>
@@ -1962,7 +1962,7 @@
       </p:grpSpPr>
       <p:sp>
         <p:nvSpPr>
-          <p:cNvPr id="2" name="Date Placeholder 1"/>
+          <p:cNvPr id="2" name="Дата 1"/>
           <p:cNvSpPr>
             <a:spLocks noGrp="1"/>
           </p:cNvSpPr>
@@ -1975,17 +1975,17 @@
           <a:bodyPr/>
           <a:lstStyle/>
           <a:p>
-            <a:fld id="{6BEA9FEF-F98A-47E0-9C21-541796582112}" type="datetimeFigureOut">
-              <a:rPr lang="en-US" smtClean="0"/>
-              <a:t>4/10/2019</a:t>
+            <a:fld id="{C5EFBD4B-3E12-4C3F-80E2-AB0596552E20}" type="datetimeFigureOut">
+              <a:rPr lang="ru-RU" smtClean="0"/>
+              <a:t>30.01.2020</a:t>
             </a:fld>
-            <a:endParaRPr lang="en-US"/>
-          </a:p>
-        </p:txBody>
-      </p:sp>
-      <p:sp>
-        <p:nvSpPr>
-          <p:cNvPr id="3" name="Footer Placeholder 2"/>
+            <a:endParaRPr lang="ru-RU"/>
+          </a:p>
+        </p:txBody>
+      </p:sp>
+      <p:sp>
+        <p:nvSpPr>
+          <p:cNvPr id="3" name="Нижний колонтитул 2"/>
           <p:cNvSpPr>
             <a:spLocks noGrp="1"/>
           </p:cNvSpPr>
@@ -1998,13 +1998,13 @@
           <a:bodyPr/>
           <a:lstStyle/>
           <a:p>
-            <a:endParaRPr lang="en-US"/>
-          </a:p>
-        </p:txBody>
-      </p:sp>
-      <p:sp>
-        <p:nvSpPr>
-          <p:cNvPr id="4" name="Slide Number Placeholder 3"/>
+            <a:endParaRPr lang="ru-RU"/>
+          </a:p>
+        </p:txBody>
+      </p:sp>
+      <p:sp>
+        <p:nvSpPr>
+          <p:cNvPr id="4" name="Номер слайда 3"/>
           <p:cNvSpPr>
             <a:spLocks noGrp="1"/>
           </p:cNvSpPr>
@@ -2017,18 +2017,18 @@
           <a:bodyPr/>
           <a:lstStyle/>
           <a:p>
-            <a:fld id="{69FECE0F-3224-4FD0-AD1A-6EBF0A13B0A2}" type="slidenum">
-              <a:rPr lang="en-US" smtClean="0"/>
+            <a:fld id="{36255947-ADA5-4F8E-8AAD-4E02849B2E3E}" type="slidenum">
+              <a:rPr lang="ru-RU" smtClean="0"/>
               <a:t>‹#›</a:t>
             </a:fld>
-            <a:endParaRPr lang="en-US"/>
+            <a:endParaRPr lang="ru-RU"/>
           </a:p>
         </p:txBody>
       </p:sp>
     </p:spTree>
     <p:extLst>
       <p:ext uri="{BB962C8B-B14F-4D97-AF65-F5344CB8AC3E}">
-        <p14:creationId xmlns:p14="http://schemas.microsoft.com/office/powerpoint/2010/main" val="1859821155"/>
+        <p14:creationId xmlns:p14="http://schemas.microsoft.com/office/powerpoint/2010/main" val="905507660"/>
       </p:ext>
     </p:extLst>
   </p:cSld>
@@ -2040,7 +2040,7 @@
 
 <file path=ppt/slideLayouts/slideLayout8.xml><?xml version="1.0" encoding="utf-8"?>
 <p:sldLayout xmlns:a="http://schemas.openxmlformats.org/drawingml/2006/main" xmlns:r="http://schemas.openxmlformats.org/officeDocument/2006/relationships" xmlns:p="http://schemas.openxmlformats.org/presentationml/2006/main" type="objTx" preserve="1">
-  <p:cSld name="Content with Caption">
+  <p:cSld name="Объект с подписью">
     <p:spTree>
       <p:nvGrpSpPr>
         <p:cNvPr id="1" name=""/>
@@ -2057,7 +2057,7 @@
       </p:grpSpPr>
       <p:sp>
         <p:nvSpPr>
-          <p:cNvPr id="2" name="Title 1"/>
+          <p:cNvPr id="2" name="Заголовок 1"/>
           <p:cNvSpPr>
             <a:spLocks noGrp="1"/>
           </p:cNvSpPr>
@@ -2080,16 +2080,16 @@
           </a:lstStyle>
           <a:p>
             <a:r>
-              <a:rPr lang="en-US" smtClean="0"/>
-              <a:t>Click to edit Master title style</a:t>
-            </a:r>
-            <a:endParaRPr lang="en-US"/>
-          </a:p>
-        </p:txBody>
-      </p:sp>
-      <p:sp>
-        <p:nvSpPr>
-          <p:cNvPr id="3" name="Content Placeholder 2"/>
+              <a:rPr lang="ru-RU" smtClean="0"/>
+              <a:t>Образец заголовка</a:t>
+            </a:r>
+            <a:endParaRPr lang="ru-RU"/>
+          </a:p>
+        </p:txBody>
+      </p:sp>
+      <p:sp>
+        <p:nvSpPr>
+          <p:cNvPr id="3" name="Объект 2"/>
           <p:cNvSpPr>
             <a:spLocks noGrp="1"/>
           </p:cNvSpPr>
@@ -2137,44 +2137,44 @@
           <a:p>
             <a:pPr lvl="0"/>
             <a:r>
-              <a:rPr lang="en-US" smtClean="0"/>
-              <a:t>Click to edit Master text styles</a:t>
+              <a:rPr lang="ru-RU" smtClean="0"/>
+              <a:t>Образец текста</a:t>
             </a:r>
           </a:p>
           <a:p>
             <a:pPr lvl="1"/>
             <a:r>
-              <a:rPr lang="en-US" smtClean="0"/>
-              <a:t>Second level</a:t>
+              <a:rPr lang="ru-RU" smtClean="0"/>
+              <a:t>Второй уровень</a:t>
             </a:r>
           </a:p>
           <a:p>
             <a:pPr lvl="2"/>
             <a:r>
-              <a:rPr lang="en-US" smtClean="0"/>
-              <a:t>Third level</a:t>
+              <a:rPr lang="ru-RU" smtClean="0"/>
+              <a:t>Третий уровень</a:t>
             </a:r>
           </a:p>
           <a:p>
             <a:pPr lvl="3"/>
             <a:r>
-              <a:rPr lang="en-US" smtClean="0"/>
-              <a:t>Fourth level</a:t>
+              <a:rPr lang="ru-RU" smtClean="0"/>
+              <a:t>Четвертый уровень</a:t>
             </a:r>
           </a:p>
           <a:p>
             <a:pPr lvl="4"/>
             <a:r>
-              <a:rPr lang="en-US" smtClean="0"/>
-              <a:t>Fifth level</a:t>
-            </a:r>
-            <a:endParaRPr lang="en-US"/>
-          </a:p>
-        </p:txBody>
-      </p:sp>
-      <p:sp>
-        <p:nvSpPr>
-          <p:cNvPr id="4" name="Text Placeholder 3"/>
+              <a:rPr lang="ru-RU" smtClean="0"/>
+              <a:t>Пятый уровень</a:t>
+            </a:r>
+            <a:endParaRPr lang="ru-RU"/>
+          </a:p>
+        </p:txBody>
+      </p:sp>
+      <p:sp>
+        <p:nvSpPr>
+          <p:cNvPr id="4" name="Текст 3"/>
           <p:cNvSpPr>
             <a:spLocks noGrp="1"/>
           </p:cNvSpPr>
@@ -2231,15 +2231,15 @@
           <a:p>
             <a:pPr lvl="0"/>
             <a:r>
-              <a:rPr lang="en-US" smtClean="0"/>
-              <a:t>Click to edit Master text styles</a:t>
-            </a:r>
-          </a:p>
-        </p:txBody>
-      </p:sp>
-      <p:sp>
-        <p:nvSpPr>
-          <p:cNvPr id="5" name="Date Placeholder 4"/>
+              <a:rPr lang="ru-RU" smtClean="0"/>
+              <a:t>Образец текста</a:t>
+            </a:r>
+          </a:p>
+        </p:txBody>
+      </p:sp>
+      <p:sp>
+        <p:nvSpPr>
+          <p:cNvPr id="5" name="Дата 4"/>
           <p:cNvSpPr>
             <a:spLocks noGrp="1"/>
           </p:cNvSpPr>
@@ -2252,17 +2252,17 @@
           <a:bodyPr/>
           <a:lstStyle/>
           <a:p>
-            <a:fld id="{6BEA9FEF-F98A-47E0-9C21-541796582112}" type="datetimeFigureOut">
-              <a:rPr lang="en-US" smtClean="0"/>
-              <a:t>4/10/2019</a:t>
+            <a:fld id="{C5EFBD4B-3E12-4C3F-80E2-AB0596552E20}" type="datetimeFigureOut">
+              <a:rPr lang="ru-RU" smtClean="0"/>
+              <a:t>30.01.2020</a:t>
             </a:fld>
-            <a:endParaRPr lang="en-US"/>
-          </a:p>
-        </p:txBody>
-      </p:sp>
-      <p:sp>
-        <p:nvSpPr>
-          <p:cNvPr id="6" name="Footer Placeholder 5"/>
+            <a:endParaRPr lang="ru-RU"/>
+          </a:p>
+        </p:txBody>
+      </p:sp>
+      <p:sp>
+        <p:nvSpPr>
+          <p:cNvPr id="6" name="Нижний колонтитул 5"/>
           <p:cNvSpPr>
             <a:spLocks noGrp="1"/>
           </p:cNvSpPr>
@@ -2275,13 +2275,13 @@
           <a:bodyPr/>
           <a:lstStyle/>
           <a:p>
-            <a:endParaRPr lang="en-US"/>
-          </a:p>
-        </p:txBody>
-      </p:sp>
-      <p:sp>
-        <p:nvSpPr>
-          <p:cNvPr id="7" name="Slide Number Placeholder 6"/>
+            <a:endParaRPr lang="ru-RU"/>
+          </a:p>
+        </p:txBody>
+      </p:sp>
+      <p:sp>
+        <p:nvSpPr>
+          <p:cNvPr id="7" name="Номер слайда 6"/>
           <p:cNvSpPr>
             <a:spLocks noGrp="1"/>
           </p:cNvSpPr>
@@ -2294,18 +2294,18 @@
           <a:bodyPr/>
           <a:lstStyle/>
           <a:p>
-            <a:fld id="{69FECE0F-3224-4FD0-AD1A-6EBF0A13B0A2}" type="slidenum">
-              <a:rPr lang="en-US" smtClean="0"/>
+            <a:fld id="{36255947-ADA5-4F8E-8AAD-4E02849B2E3E}" type="slidenum">
+              <a:rPr lang="ru-RU" smtClean="0"/>
               <a:t>‹#›</a:t>
             </a:fld>
-            <a:endParaRPr lang="en-US"/>
+            <a:endParaRPr lang="ru-RU"/>
           </a:p>
         </p:txBody>
       </p:sp>
     </p:spTree>
     <p:extLst>
       <p:ext uri="{BB962C8B-B14F-4D97-AF65-F5344CB8AC3E}">
-        <p14:creationId xmlns:p14="http://schemas.microsoft.com/office/powerpoint/2010/main" val="3028238392"/>
+        <p14:creationId xmlns:p14="http://schemas.microsoft.com/office/powerpoint/2010/main" val="970398493"/>
       </p:ext>
     </p:extLst>
   </p:cSld>
@@ -2317,7 +2317,7 @@
 
 <file path=ppt/slideLayouts/slideLayout9.xml><?xml version="1.0" encoding="utf-8"?>
 <p:sldLayout xmlns:a="http://schemas.openxmlformats.org/drawingml/2006/main" xmlns:r="http://schemas.openxmlformats.org/officeDocument/2006/relationships" xmlns:p="http://schemas.openxmlformats.org/presentationml/2006/main" type="picTx" preserve="1">
-  <p:cSld name="Picture with Caption">
+  <p:cSld name="Рисунок с подписью">
     <p:spTree>
       <p:nvGrpSpPr>
         <p:cNvPr id="1" name=""/>
@@ -2334,7 +2334,7 @@
       </p:grpSpPr>
       <p:sp>
         <p:nvSpPr>
-          <p:cNvPr id="2" name="Title 1"/>
+          <p:cNvPr id="2" name="Заголовок 1"/>
           <p:cNvSpPr>
             <a:spLocks noGrp="1"/>
           </p:cNvSpPr>
@@ -2357,16 +2357,16 @@
           </a:lstStyle>
           <a:p>
             <a:r>
-              <a:rPr lang="en-US" smtClean="0"/>
-              <a:t>Click to edit Master title style</a:t>
-            </a:r>
-            <a:endParaRPr lang="en-US"/>
-          </a:p>
-        </p:txBody>
-      </p:sp>
-      <p:sp>
-        <p:nvSpPr>
-          <p:cNvPr id="3" name="Picture Placeholder 2"/>
+              <a:rPr lang="ru-RU" smtClean="0"/>
+              <a:t>Образец заголовка</a:t>
+            </a:r>
+            <a:endParaRPr lang="ru-RU"/>
+          </a:p>
+        </p:txBody>
+      </p:sp>
+      <p:sp>
+        <p:nvSpPr>
+          <p:cNvPr id="3" name="Рисунок 2"/>
           <p:cNvSpPr>
             <a:spLocks noGrp="1"/>
           </p:cNvSpPr>
@@ -2421,13 +2421,13 @@
             </a:lvl9pPr>
           </a:lstStyle>
           <a:p>
-            <a:endParaRPr lang="en-US"/>
-          </a:p>
-        </p:txBody>
-      </p:sp>
-      <p:sp>
-        <p:nvSpPr>
-          <p:cNvPr id="4" name="Text Placeholder 3"/>
+            <a:endParaRPr lang="ru-RU"/>
+          </a:p>
+        </p:txBody>
+      </p:sp>
+      <p:sp>
+        <p:nvSpPr>
+          <p:cNvPr id="4" name="Текст 3"/>
           <p:cNvSpPr>
             <a:spLocks noGrp="1"/>
           </p:cNvSpPr>
@@ -2484,15 +2484,15 @@
           <a:p>
             <a:pPr lvl="0"/>
             <a:r>
-              <a:rPr lang="en-US" smtClean="0"/>
-              <a:t>Click to edit Master text styles</a:t>
-            </a:r>
-          </a:p>
-        </p:txBody>
-      </p:sp>
-      <p:sp>
-        <p:nvSpPr>
-          <p:cNvPr id="5" name="Date Placeholder 4"/>
+              <a:rPr lang="ru-RU" smtClean="0"/>
+              <a:t>Образец текста</a:t>
+            </a:r>
+          </a:p>
+        </p:txBody>
+      </p:sp>
+      <p:sp>
+        <p:nvSpPr>
+          <p:cNvPr id="5" name="Дата 4"/>
           <p:cNvSpPr>
             <a:spLocks noGrp="1"/>
           </p:cNvSpPr>
@@ -2505,17 +2505,17 @@
           <a:bodyPr/>
           <a:lstStyle/>
           <a:p>
-            <a:fld id="{6BEA9FEF-F98A-47E0-9C21-541796582112}" type="datetimeFigureOut">
-              <a:rPr lang="en-US" smtClean="0"/>
-              <a:t>4/10/2019</a:t>
+            <a:fld id="{C5EFBD4B-3E12-4C3F-80E2-AB0596552E20}" type="datetimeFigureOut">
+              <a:rPr lang="ru-RU" smtClean="0"/>
+              <a:t>30.01.2020</a:t>
             </a:fld>
-            <a:endParaRPr lang="en-US"/>
-          </a:p>
-        </p:txBody>
-      </p:sp>
-      <p:sp>
-        <p:nvSpPr>
-          <p:cNvPr id="6" name="Footer Placeholder 5"/>
+            <a:endParaRPr lang="ru-RU"/>
+          </a:p>
+        </p:txBody>
+      </p:sp>
+      <p:sp>
+        <p:nvSpPr>
+          <p:cNvPr id="6" name="Нижний колонтитул 5"/>
           <p:cNvSpPr>
             <a:spLocks noGrp="1"/>
           </p:cNvSpPr>
@@ -2528,13 +2528,13 @@
           <a:bodyPr/>
           <a:lstStyle/>
           <a:p>
-            <a:endParaRPr lang="en-US"/>
-          </a:p>
-        </p:txBody>
-      </p:sp>
-      <p:sp>
-        <p:nvSpPr>
-          <p:cNvPr id="7" name="Slide Number Placeholder 6"/>
+            <a:endParaRPr lang="ru-RU"/>
+          </a:p>
+        </p:txBody>
+      </p:sp>
+      <p:sp>
+        <p:nvSpPr>
+          <p:cNvPr id="7" name="Номер слайда 6"/>
           <p:cNvSpPr>
             <a:spLocks noGrp="1"/>
           </p:cNvSpPr>
@@ -2547,18 +2547,18 @@
           <a:bodyPr/>
           <a:lstStyle/>
           <a:p>
-            <a:fld id="{69FECE0F-3224-4FD0-AD1A-6EBF0A13B0A2}" type="slidenum">
-              <a:rPr lang="en-US" smtClean="0"/>
+            <a:fld id="{36255947-ADA5-4F8E-8AAD-4E02849B2E3E}" type="slidenum">
+              <a:rPr lang="ru-RU" smtClean="0"/>
               <a:t>‹#›</a:t>
             </a:fld>
-            <a:endParaRPr lang="en-US"/>
+            <a:endParaRPr lang="ru-RU"/>
           </a:p>
         </p:txBody>
       </p:sp>
     </p:spTree>
     <p:extLst>
       <p:ext uri="{BB962C8B-B14F-4D97-AF65-F5344CB8AC3E}">
-        <p14:creationId xmlns:p14="http://schemas.microsoft.com/office/powerpoint/2010/main" val="128501267"/>
+        <p14:creationId xmlns:p14="http://schemas.microsoft.com/office/powerpoint/2010/main" val="1379788422"/>
       </p:ext>
     </p:extLst>
   </p:cSld>
@@ -2592,7 +2592,7 @@
       </p:grpSpPr>
       <p:sp>
         <p:nvSpPr>
-          <p:cNvPr id="2" name="Title Placeholder 1"/>
+          <p:cNvPr id="2" name="Заголовок 1"/>
           <p:cNvSpPr>
             <a:spLocks noGrp="1"/>
           </p:cNvSpPr>
@@ -2616,16 +2616,16 @@
           <a:lstStyle/>
           <a:p>
             <a:r>
-              <a:rPr lang="en-US" smtClean="0"/>
-              <a:t>Click to edit Master title style</a:t>
-            </a:r>
-            <a:endParaRPr lang="en-US"/>
-          </a:p>
-        </p:txBody>
-      </p:sp>
-      <p:sp>
-        <p:nvSpPr>
-          <p:cNvPr id="3" name="Text Placeholder 2"/>
+              <a:rPr lang="ru-RU" smtClean="0"/>
+              <a:t>Образец заголовка</a:t>
+            </a:r>
+            <a:endParaRPr lang="ru-RU"/>
+          </a:p>
+        </p:txBody>
+      </p:sp>
+      <p:sp>
+        <p:nvSpPr>
+          <p:cNvPr id="3" name="Текст 2"/>
           <p:cNvSpPr>
             <a:spLocks noGrp="1"/>
           </p:cNvSpPr>
@@ -2650,44 +2650,44 @@
           <a:p>
             <a:pPr lvl="0"/>
             <a:r>
-              <a:rPr lang="en-US" smtClean="0"/>
-              <a:t>Click to edit Master text styles</a:t>
+              <a:rPr lang="ru-RU" smtClean="0"/>
+              <a:t>Образец текста</a:t>
             </a:r>
           </a:p>
           <a:p>
             <a:pPr lvl="1"/>
             <a:r>
-              <a:rPr lang="en-US" smtClean="0"/>
-              <a:t>Second level</a:t>
+              <a:rPr lang="ru-RU" smtClean="0"/>
+              <a:t>Второй уровень</a:t>
             </a:r>
           </a:p>
           <a:p>
             <a:pPr lvl="2"/>
             <a:r>
-              <a:rPr lang="en-US" smtClean="0"/>
-              <a:t>Third level</a:t>
+              <a:rPr lang="ru-RU" smtClean="0"/>
+              <a:t>Третий уровень</a:t>
             </a:r>
           </a:p>
           <a:p>
             <a:pPr lvl="3"/>
             <a:r>
-              <a:rPr lang="en-US" smtClean="0"/>
-              <a:t>Fourth level</a:t>
+              <a:rPr lang="ru-RU" smtClean="0"/>
+              <a:t>Четвертый уровень</a:t>
             </a:r>
           </a:p>
           <a:p>
             <a:pPr lvl="4"/>
             <a:r>
-              <a:rPr lang="en-US" smtClean="0"/>
-              <a:t>Fifth level</a:t>
-            </a:r>
-            <a:endParaRPr lang="en-US"/>
-          </a:p>
-        </p:txBody>
-      </p:sp>
-      <p:sp>
-        <p:nvSpPr>
-          <p:cNvPr id="4" name="Date Placeholder 3"/>
+              <a:rPr lang="ru-RU" smtClean="0"/>
+              <a:t>Пятый уровень</a:t>
+            </a:r>
+            <a:endParaRPr lang="ru-RU"/>
+          </a:p>
+        </p:txBody>
+      </p:sp>
+      <p:sp>
+        <p:nvSpPr>
+          <p:cNvPr id="4" name="Дата 3"/>
           <p:cNvSpPr>
             <a:spLocks noGrp="1"/>
           </p:cNvSpPr>
@@ -2718,17 +2718,17 @@
             </a:lvl1pPr>
           </a:lstStyle>
           <a:p>
-            <a:fld id="{6BEA9FEF-F98A-47E0-9C21-541796582112}" type="datetimeFigureOut">
-              <a:rPr lang="en-US" smtClean="0"/>
-              <a:t>4/10/2019</a:t>
+            <a:fld id="{C5EFBD4B-3E12-4C3F-80E2-AB0596552E20}" type="datetimeFigureOut">
+              <a:rPr lang="ru-RU" smtClean="0"/>
+              <a:t>30.01.2020</a:t>
             </a:fld>
-            <a:endParaRPr lang="en-US"/>
-          </a:p>
-        </p:txBody>
-      </p:sp>
-      <p:sp>
-        <p:nvSpPr>
-          <p:cNvPr id="5" name="Footer Placeholder 4"/>
+            <a:endParaRPr lang="ru-RU"/>
+          </a:p>
+        </p:txBody>
+      </p:sp>
+      <p:sp>
+        <p:nvSpPr>
+          <p:cNvPr id="5" name="Нижний колонтитул 4"/>
           <p:cNvSpPr>
             <a:spLocks noGrp="1"/>
           </p:cNvSpPr>
@@ -2759,13 +2759,13 @@
             </a:lvl1pPr>
           </a:lstStyle>
           <a:p>
-            <a:endParaRPr lang="en-US"/>
-          </a:p>
-        </p:txBody>
-      </p:sp>
-      <p:sp>
-        <p:nvSpPr>
-          <p:cNvPr id="6" name="Slide Number Placeholder 5"/>
+            <a:endParaRPr lang="ru-RU"/>
+          </a:p>
+        </p:txBody>
+      </p:sp>
+      <p:sp>
+        <p:nvSpPr>
+          <p:cNvPr id="6" name="Номер слайда 5"/>
           <p:cNvSpPr>
             <a:spLocks noGrp="1"/>
           </p:cNvSpPr>
@@ -2796,18 +2796,18 @@
             </a:lvl1pPr>
           </a:lstStyle>
           <a:p>
-            <a:fld id="{69FECE0F-3224-4FD0-AD1A-6EBF0A13B0A2}" type="slidenum">
-              <a:rPr lang="en-US" smtClean="0"/>
+            <a:fld id="{36255947-ADA5-4F8E-8AAD-4E02849B2E3E}" type="slidenum">
+              <a:rPr lang="ru-RU" smtClean="0"/>
               <a:t>‹#›</a:t>
             </a:fld>
-            <a:endParaRPr lang="en-US"/>
+            <a:endParaRPr lang="ru-RU"/>
           </a:p>
         </p:txBody>
       </p:sp>
     </p:spTree>
     <p:extLst>
       <p:ext uri="{BB962C8B-B14F-4D97-AF65-F5344CB8AC3E}">
-        <p14:creationId xmlns:p14="http://schemas.microsoft.com/office/powerpoint/2010/main" val="421490002"/>
+        <p14:creationId xmlns:p14="http://schemas.microsoft.com/office/powerpoint/2010/main" val="2253041485"/>
       </p:ext>
     </p:extLst>
   </p:cSld>
@@ -2847,7 +2847,7 @@
         <a:spcBef>
           <a:spcPct val="20000"/>
         </a:spcBef>
-        <a:buFont typeface="Arial" pitchFamily="34" charset="0"/>
+        <a:buFont typeface="Arial" panose="020B0604020202020204" pitchFamily="34" charset="0"/>
         <a:buChar char="•"/>
         <a:defRPr sz="3200" kern="1200">
           <a:solidFill>
@@ -2862,7 +2862,7 @@
         <a:spcBef>
           <a:spcPct val="20000"/>
         </a:spcBef>
-        <a:buFont typeface="Arial" pitchFamily="34" charset="0"/>
+        <a:buFont typeface="Arial" panose="020B0604020202020204" pitchFamily="34" charset="0"/>
         <a:buChar char="–"/>
         <a:defRPr sz="2800" kern="1200">
           <a:solidFill>
@@ -2877,7 +2877,7 @@
         <a:spcBef>
           <a:spcPct val="20000"/>
         </a:spcBef>
-        <a:buFont typeface="Arial" pitchFamily="34" charset="0"/>
+        <a:buFont typeface="Arial" panose="020B0604020202020204" pitchFamily="34" charset="0"/>
         <a:buChar char="•"/>
         <a:defRPr sz="2400" kern="1200">
           <a:solidFill>
@@ -2892,7 +2892,7 @@
         <a:spcBef>
           <a:spcPct val="20000"/>
         </a:spcBef>
-        <a:buFont typeface="Arial" pitchFamily="34" charset="0"/>
+        <a:buFont typeface="Arial" panose="020B0604020202020204" pitchFamily="34" charset="0"/>
         <a:buChar char="–"/>
         <a:defRPr sz="2000" kern="1200">
           <a:solidFill>
@@ -2907,7 +2907,7 @@
         <a:spcBef>
           <a:spcPct val="20000"/>
         </a:spcBef>
-        <a:buFont typeface="Arial" pitchFamily="34" charset="0"/>
+        <a:buFont typeface="Arial" panose="020B0604020202020204" pitchFamily="34" charset="0"/>
         <a:buChar char="»"/>
         <a:defRPr sz="2000" kern="1200">
           <a:solidFill>
@@ -2922,7 +2922,7 @@
         <a:spcBef>
           <a:spcPct val="20000"/>
         </a:spcBef>
-        <a:buFont typeface="Arial" pitchFamily="34" charset="0"/>
+        <a:buFont typeface="Arial" panose="020B0604020202020204" pitchFamily="34" charset="0"/>
         <a:buChar char="•"/>
         <a:defRPr sz="2000" kern="1200">
           <a:solidFill>
@@ -2937,7 +2937,7 @@
         <a:spcBef>
           <a:spcPct val="20000"/>
         </a:spcBef>
-        <a:buFont typeface="Arial" pitchFamily="34" charset="0"/>
+        <a:buFont typeface="Arial" panose="020B0604020202020204" pitchFamily="34" charset="0"/>
         <a:buChar char="•"/>
         <a:defRPr sz="2000" kern="1200">
           <a:solidFill>
@@ -2952,7 +2952,7 @@
         <a:spcBef>
           <a:spcPct val="20000"/>
         </a:spcBef>
-        <a:buFont typeface="Arial" pitchFamily="34" charset="0"/>
+        <a:buFont typeface="Arial" panose="020B0604020202020204" pitchFamily="34" charset="0"/>
         <a:buChar char="•"/>
         <a:defRPr sz="2000" kern="1200">
           <a:solidFill>
@@ -2967,7 +2967,7 @@
         <a:spcBef>
           <a:spcPct val="20000"/>
         </a:spcBef>
-        <a:buFont typeface="Arial" pitchFamily="34" charset="0"/>
+        <a:buFont typeface="Arial" panose="020B0604020202020204" pitchFamily="34" charset="0"/>
         <a:buChar char="•"/>
         <a:defRPr sz="2000" kern="1200">
           <a:solidFill>
@@ -2981,7 +2981,7 @@
     </p:bodyStyle>
     <p:otherStyle>
       <a:defPPr>
-        <a:defRPr lang="en-US"/>
+        <a:defRPr lang="ru-RU"/>
       </a:defPPr>
       <a:lvl1pPr marL="0" algn="l" defTabSz="914400" rtl="0" eaLnBrk="1" latinLnBrk="0" hangingPunct="1">
         <a:defRPr sz="1800" kern="1200">
@@ -3097,7 +3097,7 @@
       </p:grpSpPr>
       <p:sp>
         <p:nvSpPr>
-          <p:cNvPr id="2" name="Title 1"/>
+          <p:cNvPr id="2" name="Заголовок 1"/>
           <p:cNvSpPr>
             <a:spLocks noGrp="1"/>
           </p:cNvSpPr>
@@ -3110,13 +3110,13 @@
           <a:bodyPr/>
           <a:lstStyle/>
           <a:p>
-            <a:endParaRPr lang="en-US"/>
-          </a:p>
-        </p:txBody>
-      </p:sp>
-      <p:sp>
-        <p:nvSpPr>
-          <p:cNvPr id="3" name="Subtitle 2"/>
+            <a:endParaRPr lang="ru-RU"/>
+          </a:p>
+        </p:txBody>
+      </p:sp>
+      <p:sp>
+        <p:nvSpPr>
+          <p:cNvPr id="3" name="Подзаголовок 2"/>
           <p:cNvSpPr>
             <a:spLocks noGrp="1"/>
           </p:cNvSpPr>
@@ -3129,14 +3129,14 @@
           <a:bodyPr/>
           <a:lstStyle/>
           <a:p>
-            <a:endParaRPr lang="en-US"/>
+            <a:endParaRPr lang="ru-RU"/>
           </a:p>
         </p:txBody>
       </p:sp>
     </p:spTree>
     <p:extLst>
       <p:ext uri="{BB962C8B-B14F-4D97-AF65-F5344CB8AC3E}">
-        <p14:creationId xmlns:p14="http://schemas.microsoft.com/office/powerpoint/2010/main" val="3494433940"/>
+        <p14:creationId xmlns:p14="http://schemas.microsoft.com/office/powerpoint/2010/main" val="3500596784"/>
       </p:ext>
     </p:extLst>
   </p:cSld>
@@ -3147,9 +3147,9 @@
 </file>
 
 <file path=ppt/theme/theme1.xml><?xml version="1.0" encoding="utf-8"?>
-<a:theme xmlns:a="http://schemas.openxmlformats.org/drawingml/2006/main" name="Office Theme">
+<a:theme xmlns:a="http://schemas.openxmlformats.org/drawingml/2006/main" name="Тема Office">
   <a:themeElements>
-    <a:clrScheme name="Office">
+    <a:clrScheme name="Стандартная">
       <a:dk1>
         <a:sysClr val="windowText" lastClr="000000"/>
       </a:dk1>
@@ -3187,7 +3187,7 @@
         <a:srgbClr val="800080"/>
       </a:folHlink>
     </a:clrScheme>
-    <a:fontScheme name="Office">
+    <a:fontScheme name="Стандартная">
       <a:majorFont>
         <a:latin typeface="Calibri"/>
         <a:ea typeface=""/>
@@ -3259,7 +3259,7 @@
         <a:font script="Geor" typeface="Sylfaen"/>
       </a:minorFont>
     </a:fontScheme>
-    <a:fmtScheme name="Office">
+    <a:fmtScheme name="Стандартная">
       <a:fillStyleLst>
         <a:solidFill>
           <a:schemeClr val="phClr"/>

</xml_diff>